<commit_message>
Finished Export Reports for Win
</commit_message>
<xml_diff>
--- a/06-scheduling-scans-reports.pptx
+++ b/06-scheduling-scans-reports.pptx
@@ -6,10 +6,10 @@
     <p:sldMasterId id="2147483847" r:id="rId6"/>
   </p:sldMasterIdLst>
   <p:notesMasterIdLst>
-    <p:notesMasterId r:id="rId31"/>
+    <p:notesMasterId r:id="rId33"/>
   </p:notesMasterIdLst>
   <p:handoutMasterIdLst>
-    <p:handoutMasterId r:id="rId32"/>
+    <p:handoutMasterId r:id="rId34"/>
   </p:handoutMasterIdLst>
   <p:sldIdLst>
     <p:sldId id="256" r:id="rId7"/>
@@ -32,10 +32,12 @@
     <p:sldId id="327" r:id="rId24"/>
     <p:sldId id="326" r:id="rId25"/>
     <p:sldId id="335" r:id="rId26"/>
-    <p:sldId id="316" r:id="rId27"/>
-    <p:sldId id="332" r:id="rId28"/>
-    <p:sldId id="276" r:id="rId29"/>
-    <p:sldId id="267" r:id="rId30"/>
+    <p:sldId id="338" r:id="rId27"/>
+    <p:sldId id="339" r:id="rId28"/>
+    <p:sldId id="340" r:id="rId29"/>
+    <p:sldId id="316" r:id="rId30"/>
+    <p:sldId id="276" r:id="rId31"/>
+    <p:sldId id="267" r:id="rId32"/>
   </p:sldIdLst>
   <p:sldSz cx="16256000" cy="9144000"/>
   <p:notesSz cx="6858000" cy="9144000"/>
@@ -297,7 +299,7 @@
               <a:pPr>
                 <a:defRPr/>
               </a:pPr>
-              <a:t>2016-01-12</a:t>
+              <a:t>2016-01-14</a:t>
             </a:fld>
             <a:endParaRPr lang="en-US" dirty="0"/>
           </a:p>
@@ -480,7 +482,7 @@
               <a:pPr>
                 <a:defRPr/>
               </a:pPr>
-              <a:t>2016-01-12</a:t>
+              <a:t>2016-01-14</a:t>
             </a:fld>
             <a:endParaRPr lang="en-US" dirty="0"/>
           </a:p>
@@ -3046,7 +3048,7 @@
               <a:pPr>
                 <a:defRPr/>
               </a:pPr>
-              <a:t>21</a:t>
+              <a:t>24</a:t>
             </a:fld>
             <a:endParaRPr lang="en-US" dirty="0"/>
           </a:p>
@@ -3100,140 +3102,6 @@
     <p:extLst>
       <p:ext uri="{BB962C8B-B14F-4D97-AF65-F5344CB8AC3E}">
         <p14:creationId xmlns:p14="http://schemas.microsoft.com/office/powerpoint/2010/main" val="2076100887"/>
-      </p:ext>
-    </p:extLst>
-  </p:cSld>
-  <p:clrMapOvr>
-    <a:masterClrMapping/>
-  </p:clrMapOvr>
-</p:notes>
-</file>
-
-<file path=ppt/notesSlides/notesSlide12.xml><?xml version="1.0" encoding="utf-8"?>
-<p:notes xmlns:a="http://schemas.openxmlformats.org/drawingml/2006/main" xmlns:r="http://schemas.openxmlformats.org/officeDocument/2006/relationships" xmlns:p="http://schemas.openxmlformats.org/presentationml/2006/main">
-  <p:cSld>
-    <p:spTree>
-      <p:nvGrpSpPr>
-        <p:cNvPr id="1" name=""/>
-        <p:cNvGrpSpPr/>
-        <p:nvPr/>
-      </p:nvGrpSpPr>
-      <p:grpSpPr>
-        <a:xfrm>
-          <a:off x="0" y="0"/>
-          <a:ext cx="0" cy="0"/>
-          <a:chOff x="0" y="0"/>
-          <a:chExt cx="0" cy="0"/>
-        </a:xfrm>
-      </p:grpSpPr>
-      <p:sp>
-        <p:nvSpPr>
-          <p:cNvPr id="2" name="Slide Image Placeholder 1"/>
-          <p:cNvSpPr>
-            <a:spLocks noGrp="1" noRot="1" noChangeAspect="1"/>
-          </p:cNvSpPr>
-          <p:nvPr>
-            <p:ph type="sldImg"/>
-          </p:nvPr>
-        </p:nvSpPr>
-        <p:spPr/>
-      </p:sp>
-      <p:sp>
-        <p:nvSpPr>
-          <p:cNvPr id="3" name="Notes Placeholder 2"/>
-          <p:cNvSpPr>
-            <a:spLocks noGrp="1"/>
-          </p:cNvSpPr>
-          <p:nvPr>
-            <p:ph type="body" idx="1"/>
-          </p:nvPr>
-        </p:nvSpPr>
-        <p:spPr/>
-        <p:txBody>
-          <a:bodyPr/>
-          <a:lstStyle/>
-          <a:p>
-            <a:endParaRPr lang="en-US" dirty="0"/>
-          </a:p>
-        </p:txBody>
-      </p:sp>
-      <p:sp>
-        <p:nvSpPr>
-          <p:cNvPr id="4" name="Slide Number Placeholder 3"/>
-          <p:cNvSpPr>
-            <a:spLocks noGrp="1"/>
-          </p:cNvSpPr>
-          <p:nvPr>
-            <p:ph type="sldNum" sz="quarter" idx="10"/>
-          </p:nvPr>
-        </p:nvSpPr>
-        <p:spPr/>
-        <p:txBody>
-          <a:bodyPr/>
-          <a:lstStyle/>
-          <a:p>
-            <a:pPr>
-              <a:defRPr/>
-            </a:pPr>
-            <a:fld id="{DC3734AA-3150-D947-AC52-2F5DF48BFCD5}" type="slidenum">
-              <a:rPr lang="en-US" smtClean="0"/>
-              <a:pPr>
-                <a:defRPr/>
-              </a:pPr>
-              <a:t>22</a:t>
-            </a:fld>
-            <a:endParaRPr lang="en-US" dirty="0"/>
-          </a:p>
-        </p:txBody>
-      </p:sp>
-      <p:sp>
-        <p:nvSpPr>
-          <p:cNvPr id="5" name="Header Placeholder 4"/>
-          <p:cNvSpPr>
-            <a:spLocks noGrp="1"/>
-          </p:cNvSpPr>
-          <p:nvPr>
-            <p:ph type="hdr" sz="quarter" idx="11"/>
-          </p:nvPr>
-        </p:nvSpPr>
-        <p:spPr/>
-        <p:txBody>
-          <a:bodyPr/>
-          <a:lstStyle/>
-          <a:p>
-            <a:pPr>
-              <a:defRPr/>
-            </a:pPr>
-            <a:endParaRPr lang="en-US"/>
-          </a:p>
-        </p:txBody>
-      </p:sp>
-      <p:sp>
-        <p:nvSpPr>
-          <p:cNvPr id="6" name="Footer Placeholder 5"/>
-          <p:cNvSpPr>
-            <a:spLocks noGrp="1"/>
-          </p:cNvSpPr>
-          <p:nvPr>
-            <p:ph type="ftr" sz="quarter" idx="12"/>
-          </p:nvPr>
-        </p:nvSpPr>
-        <p:spPr/>
-        <p:txBody>
-          <a:bodyPr/>
-          <a:lstStyle/>
-          <a:p>
-            <a:pPr>
-              <a:defRPr/>
-            </a:pPr>
-            <a:endParaRPr lang="en-US"/>
-          </a:p>
-        </p:txBody>
-      </p:sp>
-    </p:spTree>
-    <p:extLst>
-      <p:ext uri="{BB962C8B-B14F-4D97-AF65-F5344CB8AC3E}">
-        <p14:creationId xmlns:p14="http://schemas.microsoft.com/office/powerpoint/2010/main" val="2361220506"/>
       </p:ext>
     </p:extLst>
   </p:cSld>
@@ -3944,11 +3812,58 @@
             </a:r>
             <a:r>
               <a:rPr lang="en-US" dirty="0" smtClean="0"/>
-              <a:t>Compliance Server</a:t>
+              <a:t>Compliance Server web UI</a:t>
             </a:r>
             <a:r>
               <a:rPr lang="en-US" baseline="0" dirty="0" smtClean="0"/>
               <a:t>, logged in again, and the scan would properly schedule and run.</a:t>
+            </a:r>
+          </a:p>
+          <a:p>
+            <a:pPr marL="0" marR="0" indent="0" algn="l" defTabSz="1217613" rtl="0" eaLnBrk="1" fontAlgn="base" latinLnBrk="0" hangingPunct="1">
+              <a:lnSpc>
+                <a:spcPct val="90000"/>
+              </a:lnSpc>
+              <a:spcBef>
+                <a:spcPct val="30000"/>
+              </a:spcBef>
+              <a:spcAft>
+                <a:spcPts val="450"/>
+              </a:spcAft>
+              <a:buClrTx/>
+              <a:buSzTx/>
+              <a:buFontTx/>
+              <a:buNone/>
+              <a:tabLst/>
+              <a:defRPr/>
+            </a:pPr>
+            <a:endParaRPr lang="en-US" baseline="0" dirty="0" smtClean="0"/>
+          </a:p>
+          <a:p>
+            <a:pPr marL="0" marR="0" indent="0" algn="l" defTabSz="1217613" rtl="0" eaLnBrk="1" fontAlgn="base" latinLnBrk="0" hangingPunct="1">
+              <a:lnSpc>
+                <a:spcPct val="90000"/>
+              </a:lnSpc>
+              <a:spcBef>
+                <a:spcPct val="30000"/>
+              </a:spcBef>
+              <a:spcAft>
+                <a:spcPts val="450"/>
+              </a:spcAft>
+              <a:buClrTx/>
+              <a:buSzTx/>
+              <a:buFontTx/>
+              <a:buNone/>
+              <a:tabLst/>
+              <a:defRPr/>
+            </a:pPr>
+            <a:r>
+              <a:rPr lang="en-US" dirty="0" smtClean="0"/>
+              <a:t>Instructor Note: If you find yourself ahead of schedule, you can spend some</a:t>
+            </a:r>
+            <a:r>
+              <a:rPr lang="en-US" baseline="0" dirty="0" smtClean="0"/>
+              <a:t> time demonstration the output of this log file as you perform a number of procedures via the Web UI.</a:t>
             </a:r>
             <a:endParaRPr lang="en-US" dirty="0" smtClean="0"/>
           </a:p>
@@ -4131,7 +4046,7 @@
             </a:r>
             <a:r>
               <a:rPr lang="en-US" baseline="0" dirty="0" smtClean="0"/>
-              <a:t>taken at the very same time as the scan was scheduled. Notice the log file timestamps are in UTC and the next schedule scan is set for </a:t>
+              <a:t>taken at the very same time that the scan was scheduled. Notice the log file timestamps are in UTC and the next schedule scan is set for </a:t>
             </a:r>
             <a:br>
               <a:rPr lang="en-US" baseline="0" dirty="0" smtClean="0"/>
@@ -4420,6 +4335,18 @@
           <a:bodyPr/>
           <a:lstStyle/>
           <a:p>
+            <a:r>
+              <a:rPr lang="en-US" dirty="0" smtClean="0"/>
+              <a:t>TBD explain </a:t>
+            </a:r>
+            <a:r>
+              <a:rPr lang="en-US" dirty="0" err="1" smtClean="0"/>
+              <a:t>json</a:t>
+            </a:r>
+            <a:r>
+              <a:rPr lang="en-US" dirty="0" smtClean="0"/>
+              <a:t> exporting?</a:t>
+            </a:r>
             <a:endParaRPr lang="en-US" dirty="0"/>
           </a:p>
         </p:txBody>
@@ -5075,14 +5002,14 @@
           </a:ln>
           <a:extLst>
             <a:ext uri="{909E8E84-426E-40dd-AFC4-6F175D3DCCD1}">
-              <a14:hiddenFill xmlns:a14="http://schemas.microsoft.com/office/drawing/2010/main" xmlns="">
+              <a14:hiddenFill xmlns="" xmlns:a14="http://schemas.microsoft.com/office/drawing/2010/main">
                 <a:solidFill>
                   <a:srgbClr val="FFFFFF"/>
                 </a:solidFill>
               </a14:hiddenFill>
             </a:ext>
             <a:ext uri="{91240B29-F687-4f45-9708-019B960494DF}">
-              <a14:hiddenLine xmlns:a14="http://schemas.microsoft.com/office/drawing/2010/main" xmlns="" w="9525">
+              <a14:hiddenLine xmlns="" xmlns:a14="http://schemas.microsoft.com/office/drawing/2010/main" w="9525">
                 <a:solidFill>
                   <a:srgbClr val="000000"/>
                 </a:solidFill>
@@ -5230,14 +5157,14 @@
           </a:ln>
           <a:extLst>
             <a:ext uri="{909E8E84-426E-40dd-AFC4-6F175D3DCCD1}">
-              <a14:hiddenFill xmlns:a14="http://schemas.microsoft.com/office/drawing/2010/main" xmlns="">
+              <a14:hiddenFill xmlns="" xmlns:a14="http://schemas.microsoft.com/office/drawing/2010/main">
                 <a:solidFill>
                   <a:srgbClr val="FFFFFF"/>
                 </a:solidFill>
               </a14:hiddenFill>
             </a:ext>
             <a:ext uri="{91240B29-F687-4f45-9708-019B960494DF}">
-              <a14:hiddenLine xmlns:a14="http://schemas.microsoft.com/office/drawing/2010/main" xmlns="" w="9525">
+              <a14:hiddenLine xmlns="" xmlns:a14="http://schemas.microsoft.com/office/drawing/2010/main" w="9525">
                 <a:solidFill>
                   <a:srgbClr val="000000"/>
                 </a:solidFill>
@@ -5728,14 +5655,14 @@
           </a:ln>
           <a:extLst>
             <a:ext uri="{909E8E84-426E-40dd-AFC4-6F175D3DCCD1}">
-              <a14:hiddenFill xmlns:a14="http://schemas.microsoft.com/office/drawing/2010/main" xmlns="">
+              <a14:hiddenFill xmlns="" xmlns:a14="http://schemas.microsoft.com/office/drawing/2010/main">
                 <a:solidFill>
                   <a:srgbClr val="FFFFFF"/>
                 </a:solidFill>
               </a14:hiddenFill>
             </a:ext>
             <a:ext uri="{91240B29-F687-4f45-9708-019B960494DF}">
-              <a14:hiddenLine xmlns:a14="http://schemas.microsoft.com/office/drawing/2010/main" xmlns="" w="9525">
+              <a14:hiddenLine xmlns="" xmlns:a14="http://schemas.microsoft.com/office/drawing/2010/main" w="9525">
                 <a:solidFill>
                   <a:srgbClr val="000000"/>
                 </a:solidFill>
@@ -6261,14 +6188,14 @@
           </a:ln>
           <a:extLst>
             <a:ext uri="{909E8E84-426E-40dd-AFC4-6F175D3DCCD1}">
-              <a14:hiddenFill xmlns:a14="http://schemas.microsoft.com/office/drawing/2010/main" xmlns="">
+              <a14:hiddenFill xmlns="" xmlns:a14="http://schemas.microsoft.com/office/drawing/2010/main">
                 <a:solidFill>
                   <a:srgbClr val="FFFFFF"/>
                 </a:solidFill>
               </a14:hiddenFill>
             </a:ext>
             <a:ext uri="{91240B29-F687-4f45-9708-019B960494DF}">
-              <a14:hiddenLine xmlns:a14="http://schemas.microsoft.com/office/drawing/2010/main" xmlns="" w="9525">
+              <a14:hiddenLine xmlns="" xmlns:a14="http://schemas.microsoft.com/office/drawing/2010/main" w="9525">
                 <a:solidFill>
                   <a:srgbClr val="000000"/>
                 </a:solidFill>
@@ -7892,14 +7819,14 @@
           </a:ln>
           <a:extLst>
             <a:ext uri="{909E8E84-426E-40dd-AFC4-6F175D3DCCD1}">
-              <a14:hiddenFill xmlns:a14="http://schemas.microsoft.com/office/drawing/2010/main" xmlns="">
+              <a14:hiddenFill xmlns="" xmlns:a14="http://schemas.microsoft.com/office/drawing/2010/main">
                 <a:solidFill>
                   <a:srgbClr val="FFFFFF"/>
                 </a:solidFill>
               </a14:hiddenFill>
             </a:ext>
             <a:ext uri="{91240B29-F687-4f45-9708-019B960494DF}">
-              <a14:hiddenLine xmlns:a14="http://schemas.microsoft.com/office/drawing/2010/main" xmlns="" w="9525">
+              <a14:hiddenLine xmlns="" xmlns:a14="http://schemas.microsoft.com/office/drawing/2010/main" w="9525">
                 <a:solidFill>
                   <a:srgbClr val="000000"/>
                 </a:solidFill>
@@ -9433,14 +9360,14 @@
           </a:ln>
           <a:extLst>
             <a:ext uri="{909E8E84-426E-40dd-AFC4-6F175D3DCCD1}">
-              <a14:hiddenFill xmlns:a14="http://schemas.microsoft.com/office/drawing/2010/main" xmlns="">
+              <a14:hiddenFill xmlns="" xmlns:a14="http://schemas.microsoft.com/office/drawing/2010/main">
                 <a:solidFill>
                   <a:srgbClr val="FFFFFF"/>
                 </a:solidFill>
               </a14:hiddenFill>
             </a:ext>
             <a:ext uri="{91240B29-F687-4f45-9708-019B960494DF}">
-              <a14:hiddenLine xmlns:a14="http://schemas.microsoft.com/office/drawing/2010/main" xmlns="" w="9525">
+              <a14:hiddenLine xmlns="" xmlns:a14="http://schemas.microsoft.com/office/drawing/2010/main" w="9525">
                 <a:solidFill>
                   <a:srgbClr val="000000"/>
                 </a:solidFill>
@@ -9946,14 +9873,14 @@
           </a:ln>
           <a:extLst>
             <a:ext uri="{909E8E84-426E-40dd-AFC4-6F175D3DCCD1}">
-              <a14:hiddenFill xmlns:a14="http://schemas.microsoft.com/office/drawing/2010/main" xmlns="">
+              <a14:hiddenFill xmlns="" xmlns:a14="http://schemas.microsoft.com/office/drawing/2010/main">
                 <a:solidFill>
                   <a:srgbClr val="FFFFFF"/>
                 </a:solidFill>
               </a14:hiddenFill>
             </a:ext>
             <a:ext uri="{91240B29-F687-4f45-9708-019B960494DF}">
-              <a14:hiddenLine xmlns:a14="http://schemas.microsoft.com/office/drawing/2010/main" xmlns="" w="9525">
+              <a14:hiddenLine xmlns="" xmlns:a14="http://schemas.microsoft.com/office/drawing/2010/main" w="9525">
                 <a:solidFill>
                   <a:srgbClr val="000000"/>
                 </a:solidFill>
@@ -10520,14 +10447,14 @@
           </a:ln>
           <a:extLst>
             <a:ext uri="{909E8E84-426E-40dd-AFC4-6F175D3DCCD1}">
-              <a14:hiddenFill xmlns:a14="http://schemas.microsoft.com/office/drawing/2010/main" xmlns="">
+              <a14:hiddenFill xmlns="" xmlns:a14="http://schemas.microsoft.com/office/drawing/2010/main">
                 <a:solidFill>
                   <a:srgbClr val="FFFFFF"/>
                 </a:solidFill>
               </a14:hiddenFill>
             </a:ext>
             <a:ext uri="{91240B29-F687-4f45-9708-019B960494DF}">
-              <a14:hiddenLine xmlns:a14="http://schemas.microsoft.com/office/drawing/2010/main" xmlns="" w="9525">
+              <a14:hiddenLine xmlns="" xmlns:a14="http://schemas.microsoft.com/office/drawing/2010/main" w="9525">
                 <a:solidFill>
                   <a:srgbClr val="000000"/>
                 </a:solidFill>
@@ -11467,14 +11394,14 @@
           </a:ln>
           <a:extLst>
             <a:ext uri="{909E8E84-426E-40dd-AFC4-6F175D3DCCD1}">
-              <a14:hiddenFill xmlns:a14="http://schemas.microsoft.com/office/drawing/2010/main" xmlns="">
+              <a14:hiddenFill xmlns="" xmlns:a14="http://schemas.microsoft.com/office/drawing/2010/main">
                 <a:solidFill>
                   <a:srgbClr val="FFFFFF"/>
                 </a:solidFill>
               </a14:hiddenFill>
             </a:ext>
             <a:ext uri="{91240B29-F687-4f45-9708-019B960494DF}">
-              <a14:hiddenLine xmlns:a14="http://schemas.microsoft.com/office/drawing/2010/main" xmlns="" w="9525">
+              <a14:hiddenLine xmlns="" xmlns:a14="http://schemas.microsoft.com/office/drawing/2010/main" w="9525">
                 <a:solidFill>
                   <a:srgbClr val="000000"/>
                 </a:solidFill>
@@ -12227,14 +12154,14 @@
           </a:ln>
           <a:extLst>
             <a:ext uri="{909E8E84-426E-40dd-AFC4-6F175D3DCCD1}">
-              <a14:hiddenFill xmlns:a14="http://schemas.microsoft.com/office/drawing/2010/main" xmlns="">
+              <a14:hiddenFill xmlns="" xmlns:a14="http://schemas.microsoft.com/office/drawing/2010/main">
                 <a:solidFill>
                   <a:srgbClr val="FFFFFF"/>
                 </a:solidFill>
               </a14:hiddenFill>
             </a:ext>
             <a:ext uri="{91240B29-F687-4f45-9708-019B960494DF}">
-              <a14:hiddenLine xmlns:a14="http://schemas.microsoft.com/office/drawing/2010/main" xmlns="" w="9525">
+              <a14:hiddenLine xmlns="" xmlns:a14="http://schemas.microsoft.com/office/drawing/2010/main" w="9525">
                 <a:solidFill>
                   <a:srgbClr val="000000"/>
                 </a:solidFill>
@@ -13021,19 +12948,7 @@
           <a:p>
             <a:r>
               <a:rPr lang="en-US" dirty="0" smtClean="0"/>
-              <a:t>Scheduling </a:t>
-            </a:r>
-            <a:r>
-              <a:rPr lang="en-US" dirty="0" smtClean="0"/>
-              <a:t>Scans </a:t>
-            </a:r>
-            <a:r>
-              <a:rPr lang="en-US" dirty="0" smtClean="0"/>
-              <a:t>for </a:t>
-            </a:r>
-            <a:r>
-              <a:rPr lang="en-US" dirty="0" smtClean="0"/>
-              <a:t>Future </a:t>
+              <a:t>Scheduling Scans for Future </a:t>
             </a:r>
             <a:r>
               <a:rPr lang="en-US" dirty="0"/>
@@ -13790,11 +13705,7 @@
           <a:p>
             <a:r>
               <a:rPr lang="en-US" dirty="0" smtClean="0"/>
-              <a:t>Demonstration: </a:t>
-            </a:r>
-            <a:r>
-              <a:rPr lang="en-US" dirty="0" smtClean="0"/>
-              <a:t>Scheduled Scan Logs</a:t>
+              <a:t>Demonstration: Scheduled Scan Logs</a:t>
             </a:r>
             <a:endParaRPr lang="en-US" dirty="0"/>
           </a:p>
@@ -13843,11 +13754,7 @@
           <a:p>
             <a:r>
               <a:rPr lang="en-US" dirty="0" smtClean="0"/>
-              <a:t>To tail those logs, f</a:t>
-            </a:r>
-            <a:r>
-              <a:rPr lang="en-US" dirty="0" smtClean="0"/>
-              <a:t>rom your Compliance Server you can run:</a:t>
+              <a:t>To tail those logs, from your Compliance Server you can run:</a:t>
             </a:r>
             <a:br>
               <a:rPr lang="en-US" dirty="0" smtClean="0"/>
@@ -13933,11 +13840,7 @@
           <a:p>
             <a:r>
               <a:rPr lang="en-US" dirty="0" smtClean="0"/>
-              <a:t>Demonstration: </a:t>
-            </a:r>
-            <a:r>
-              <a:rPr lang="en-US" dirty="0" smtClean="0"/>
-              <a:t>Scheduled Scan Logs</a:t>
+              <a:t>Demonstration: Scheduled Scan Logs</a:t>
             </a:r>
             <a:endParaRPr lang="en-US" dirty="0"/>
           </a:p>
@@ -14116,7 +14019,7 @@
           <a:p>
             <a:r>
               <a:rPr lang="en-US" dirty="0" smtClean="0"/>
-              <a:t>The list of old scheduled jobs can grow so you should delete them if you no longer need them.</a:t>
+              <a:t>The list of old scheduled jobs can grow so you can delete them if you no longer need them.</a:t>
             </a:r>
             <a:endParaRPr lang="en-US" dirty="0"/>
           </a:p>
@@ -14542,10 +14445,9 @@
               <a:buChar char="Ø"/>
             </a:pPr>
             <a:r>
-              <a:rPr lang="en-US" smtClean="0"/>
+              <a:rPr lang="en-US" dirty="0" smtClean="0"/>
               <a:t>View pending jobs.</a:t>
             </a:r>
-            <a:endParaRPr lang="en-US" dirty="0" smtClean="0"/>
           </a:p>
           <a:p>
             <a:pPr marL="457200" indent="-457200">
@@ -14554,7 +14456,11 @@
             </a:pPr>
             <a:r>
               <a:rPr lang="en-US" dirty="0" smtClean="0"/>
-              <a:t>Run Reports.</a:t>
+              <a:t>View and export reports</a:t>
+            </a:r>
+            <a:r>
+              <a:rPr lang="en-US" dirty="0" smtClean="0"/>
+              <a:t>.</a:t>
             </a:r>
           </a:p>
           <a:p>
@@ -14639,8 +14545,8 @@
         </p:nvSpPr>
         <p:spPr>
           <a:xfrm>
-            <a:off x="1671638" y="3228296"/>
-            <a:ext cx="12319000" cy="4317682"/>
+            <a:off x="1671638" y="3188540"/>
+            <a:ext cx="12319000" cy="3033356"/>
           </a:xfrm>
         </p:spPr>
         <p:txBody>
@@ -14649,21 +14555,25 @@
           <a:p>
             <a:r>
               <a:rPr lang="en-US" dirty="0" smtClean="0"/>
-              <a:t>In the near future, Chef Compliance will also support exporting reports to Excel and sending to an </a:t>
-            </a:r>
-            <a:r>
-              <a:rPr lang="en-US" smtClean="0"/>
-              <a:t>email</a:t>
-            </a:r>
-            <a:r>
-              <a:rPr lang="en-US"/>
+              <a:t>You can also export a compliance report as a PDF.</a:t>
+            </a:r>
+          </a:p>
+          <a:p>
+            <a:endParaRPr lang="en-US" dirty="0"/>
+          </a:p>
+          <a:p>
+            <a:r>
+              <a:rPr lang="en-US" dirty="0" smtClean="0"/>
+              <a:t>In the near future, Chef Compliance will also support exporting reports to Excel and sending to an email</a:t>
+            </a:r>
+            <a:r>
+              <a:rPr lang="en-US" dirty="0"/>
               <a:t> </a:t>
             </a:r>
             <a:r>
-              <a:rPr lang="en-US" smtClean="0"/>
+              <a:rPr lang="en-US" dirty="0" smtClean="0"/>
               <a:t>recipient.</a:t>
             </a:r>
-            <a:endParaRPr lang="en-US" dirty="0" smtClean="0"/>
           </a:p>
           <a:p>
             <a:endParaRPr lang="en-US" dirty="0"/>
@@ -14692,8 +14602,8 @@
         </p:blipFill>
         <p:spPr>
           <a:xfrm>
-            <a:off x="2753135" y="4417016"/>
-            <a:ext cx="10749730" cy="3641213"/>
+            <a:off x="4214191" y="5278458"/>
+            <a:ext cx="8089177" cy="2740015"/>
           </a:xfrm>
           <a:prstGeom prst="rect">
             <a:avLst/>
@@ -14752,6 +14662,501 @@
             <a:spLocks noGrp="1"/>
           </p:cNvSpPr>
           <p:nvPr>
+            <p:ph type="title"/>
+          </p:nvPr>
+        </p:nvSpPr>
+        <p:spPr/>
+        <p:txBody>
+          <a:bodyPr/>
+          <a:lstStyle/>
+          <a:p>
+            <a:r>
+              <a:rPr lang="en-US" dirty="0" smtClean="0"/>
+              <a:t>GE: Exporting Reports</a:t>
+            </a:r>
+            <a:endParaRPr lang="en-US" dirty="0"/>
+          </a:p>
+        </p:txBody>
+      </p:sp>
+      <p:sp>
+        <p:nvSpPr>
+          <p:cNvPr id="3" name="Text Placeholder 2"/>
+          <p:cNvSpPr>
+            <a:spLocks noGrp="1"/>
+          </p:cNvSpPr>
+          <p:nvPr>
+            <p:ph type="body" sz="quarter" idx="12"/>
+          </p:nvPr>
+        </p:nvSpPr>
+        <p:spPr>
+          <a:xfrm>
+            <a:off x="650040" y="1856198"/>
+            <a:ext cx="4876117" cy="5345953"/>
+          </a:xfrm>
+        </p:spPr>
+        <p:txBody>
+          <a:bodyPr/>
+          <a:lstStyle/>
+          <a:p>
+            <a:pPr marL="514350" indent="-514350">
+              <a:buFont typeface="+mj-lt"/>
+              <a:buAutoNum type="arabicPeriod"/>
+            </a:pPr>
+            <a:r>
+              <a:rPr lang="en-US" dirty="0" smtClean="0"/>
+              <a:t>From the left column of the web UI, click </a:t>
+            </a:r>
+            <a:r>
+              <a:rPr lang="en-US" b="1" dirty="0" smtClean="0"/>
+              <a:t>Reports</a:t>
+            </a:r>
+            <a:r>
+              <a:rPr lang="en-US" dirty="0" smtClean="0"/>
+              <a:t> and then click any report that may exist.</a:t>
+            </a:r>
+          </a:p>
+          <a:p>
+            <a:endParaRPr lang="en-US" dirty="0"/>
+          </a:p>
+        </p:txBody>
+      </p:sp>
+      <p:pic>
+        <p:nvPicPr>
+          <p:cNvPr id="7" name="Picture 6"/>
+          <p:cNvPicPr>
+            <a:picLocks noChangeAspect="1"/>
+          </p:cNvPicPr>
+          <p:nvPr/>
+        </p:nvPicPr>
+        <p:blipFill>
+          <a:blip r:embed="rId2"/>
+          <a:stretch>
+            <a:fillRect/>
+          </a:stretch>
+        </p:blipFill>
+        <p:spPr>
+          <a:xfrm>
+            <a:off x="6762655" y="1856198"/>
+            <a:ext cx="8446743" cy="2868475"/>
+          </a:xfrm>
+          <a:prstGeom prst="rect">
+            <a:avLst/>
+          </a:prstGeom>
+          <a:ln>
+            <a:solidFill>
+              <a:schemeClr val="accent1"/>
+            </a:solidFill>
+          </a:ln>
+        </p:spPr>
+      </p:pic>
+    </p:spTree>
+    <p:extLst>
+      <p:ext uri="{BB962C8B-B14F-4D97-AF65-F5344CB8AC3E}">
+        <p14:creationId xmlns:p14="http://schemas.microsoft.com/office/powerpoint/2010/main" val="3910387577"/>
+      </p:ext>
+    </p:extLst>
+  </p:cSld>
+  <p:clrMapOvr>
+    <a:masterClrMapping/>
+  </p:clrMapOvr>
+  <p:transition spd="med">
+    <p:fade/>
+  </p:transition>
+</p:sld>
+</file>
+
+<file path=ppt/slides/slide22.xml><?xml version="1.0" encoding="utf-8"?>
+<p:sld xmlns:a="http://schemas.openxmlformats.org/drawingml/2006/main" xmlns:r="http://schemas.openxmlformats.org/officeDocument/2006/relationships" xmlns:p="http://schemas.openxmlformats.org/presentationml/2006/main">
+  <p:cSld>
+    <p:spTree>
+      <p:nvGrpSpPr>
+        <p:cNvPr id="1" name=""/>
+        <p:cNvGrpSpPr/>
+        <p:nvPr/>
+      </p:nvGrpSpPr>
+      <p:grpSpPr>
+        <a:xfrm>
+          <a:off x="0" y="0"/>
+          <a:ext cx="0" cy="0"/>
+          <a:chOff x="0" y="0"/>
+          <a:chExt cx="0" cy="0"/>
+        </a:xfrm>
+      </p:grpSpPr>
+      <p:sp>
+        <p:nvSpPr>
+          <p:cNvPr id="2" name="Title 1"/>
+          <p:cNvSpPr>
+            <a:spLocks noGrp="1"/>
+          </p:cNvSpPr>
+          <p:nvPr>
+            <p:ph type="title"/>
+          </p:nvPr>
+        </p:nvSpPr>
+        <p:spPr/>
+        <p:txBody>
+          <a:bodyPr/>
+          <a:lstStyle/>
+          <a:p>
+            <a:r>
+              <a:rPr lang="en-US" dirty="0" smtClean="0"/>
+              <a:t>GE: Exporting Reports</a:t>
+            </a:r>
+            <a:endParaRPr lang="en-US" dirty="0"/>
+          </a:p>
+        </p:txBody>
+      </p:sp>
+      <p:sp>
+        <p:nvSpPr>
+          <p:cNvPr id="3" name="Text Placeholder 2"/>
+          <p:cNvSpPr>
+            <a:spLocks noGrp="1"/>
+          </p:cNvSpPr>
+          <p:nvPr>
+            <p:ph type="body" sz="quarter" idx="12"/>
+          </p:nvPr>
+        </p:nvSpPr>
+        <p:spPr>
+          <a:xfrm>
+            <a:off x="272352" y="1856198"/>
+            <a:ext cx="4876117" cy="5345953"/>
+          </a:xfrm>
+        </p:spPr>
+        <p:txBody>
+          <a:bodyPr/>
+          <a:lstStyle/>
+          <a:p>
+            <a:pPr marL="514350" indent="-514350">
+              <a:buFont typeface="+mj-lt"/>
+              <a:buAutoNum type="arabicPeriod" startAt="2"/>
+            </a:pPr>
+            <a:r>
+              <a:rPr lang="en-US" dirty="0" smtClean="0"/>
+              <a:t>Right-click on the report page and then click </a:t>
+            </a:r>
+            <a:r>
+              <a:rPr lang="en-US" b="1" dirty="0" smtClean="0"/>
+              <a:t>Print</a:t>
+            </a:r>
+            <a:r>
+              <a:rPr lang="en-US" dirty="0" smtClean="0"/>
+              <a:t>.</a:t>
+            </a:r>
+          </a:p>
+          <a:p>
+            <a:pPr marL="514350" indent="-514350">
+              <a:buFont typeface="+mj-lt"/>
+              <a:buAutoNum type="arabicPeriod" startAt="2"/>
+            </a:pPr>
+            <a:r>
+              <a:rPr lang="en-US" dirty="0" smtClean="0"/>
+              <a:t>Ensure your print option is set to PDF and save and then click </a:t>
+            </a:r>
+            <a:r>
+              <a:rPr lang="en-US" b="1" dirty="0" smtClean="0"/>
+              <a:t>Save</a:t>
+            </a:r>
+            <a:r>
+              <a:rPr lang="en-US" dirty="0" smtClean="0"/>
+              <a:t>, thus saving to you local laptop.</a:t>
+            </a:r>
+          </a:p>
+          <a:p>
+            <a:pPr marL="514350" indent="-514350">
+              <a:buFont typeface="+mj-lt"/>
+              <a:buAutoNum type="arabicPeriod" startAt="2"/>
+            </a:pPr>
+            <a:endParaRPr lang="en-US" dirty="0" smtClean="0"/>
+          </a:p>
+          <a:p>
+            <a:endParaRPr lang="en-US" dirty="0"/>
+          </a:p>
+        </p:txBody>
+      </p:sp>
+      <p:pic>
+        <p:nvPicPr>
+          <p:cNvPr id="4" name="Picture 3"/>
+          <p:cNvPicPr>
+            <a:picLocks noChangeAspect="1"/>
+          </p:cNvPicPr>
+          <p:nvPr/>
+        </p:nvPicPr>
+        <p:blipFill>
+          <a:blip r:embed="rId2"/>
+          <a:stretch>
+            <a:fillRect/>
+          </a:stretch>
+        </p:blipFill>
+        <p:spPr>
+          <a:xfrm>
+            <a:off x="7171979" y="1172365"/>
+            <a:ext cx="8651117" cy="2425644"/>
+          </a:xfrm>
+          <a:prstGeom prst="rect">
+            <a:avLst/>
+          </a:prstGeom>
+          <a:ln>
+            <a:solidFill>
+              <a:schemeClr val="accent1"/>
+            </a:solidFill>
+          </a:ln>
+        </p:spPr>
+      </p:pic>
+      <p:pic>
+        <p:nvPicPr>
+          <p:cNvPr id="5" name="Picture 4"/>
+          <p:cNvPicPr>
+            <a:picLocks noChangeAspect="1"/>
+          </p:cNvPicPr>
+          <p:nvPr/>
+        </p:nvPicPr>
+        <p:blipFill>
+          <a:blip r:embed="rId3"/>
+          <a:stretch>
+            <a:fillRect/>
+          </a:stretch>
+        </p:blipFill>
+        <p:spPr>
+          <a:xfrm>
+            <a:off x="5301283" y="3791024"/>
+            <a:ext cx="10601325" cy="4133850"/>
+          </a:xfrm>
+          <a:prstGeom prst="rect">
+            <a:avLst/>
+          </a:prstGeom>
+          <a:ln>
+            <a:solidFill>
+              <a:schemeClr val="accent1"/>
+            </a:solidFill>
+          </a:ln>
+        </p:spPr>
+      </p:pic>
+      <p:cxnSp>
+        <p:nvCxnSpPr>
+          <p:cNvPr id="8" name="Straight Arrow Connector 7"/>
+          <p:cNvCxnSpPr/>
+          <p:nvPr/>
+        </p:nvCxnSpPr>
+        <p:spPr>
+          <a:xfrm>
+            <a:off x="4253948" y="2902226"/>
+            <a:ext cx="7176052" cy="19878"/>
+          </a:xfrm>
+          <a:prstGeom prst="straightConnector1">
+            <a:avLst/>
+          </a:prstGeom>
+          <a:ln>
+            <a:solidFill>
+              <a:schemeClr val="accent4"/>
+            </a:solidFill>
+            <a:tailEnd type="triangle"/>
+          </a:ln>
+        </p:spPr>
+        <p:style>
+          <a:lnRef idx="3">
+            <a:schemeClr val="accent1"/>
+          </a:lnRef>
+          <a:fillRef idx="0">
+            <a:schemeClr val="accent1"/>
+          </a:fillRef>
+          <a:effectRef idx="2">
+            <a:schemeClr val="accent1"/>
+          </a:effectRef>
+          <a:fontRef idx="minor">
+            <a:schemeClr val="tx1"/>
+          </a:fontRef>
+        </p:style>
+      </p:cxnSp>
+      <p:cxnSp>
+        <p:nvCxnSpPr>
+          <p:cNvPr id="9" name="Straight Arrow Connector 8"/>
+          <p:cNvCxnSpPr/>
+          <p:nvPr/>
+        </p:nvCxnSpPr>
+        <p:spPr>
+          <a:xfrm flipV="1">
+            <a:off x="2572198" y="5052188"/>
+            <a:ext cx="4385193" cy="805761"/>
+          </a:xfrm>
+          <a:prstGeom prst="straightConnector1">
+            <a:avLst/>
+          </a:prstGeom>
+          <a:ln>
+            <a:solidFill>
+              <a:schemeClr val="accent4"/>
+            </a:solidFill>
+            <a:tailEnd type="triangle"/>
+          </a:ln>
+        </p:spPr>
+        <p:style>
+          <a:lnRef idx="3">
+            <a:schemeClr val="accent1"/>
+          </a:lnRef>
+          <a:fillRef idx="0">
+            <a:schemeClr val="accent1"/>
+          </a:fillRef>
+          <a:effectRef idx="2">
+            <a:schemeClr val="accent1"/>
+          </a:effectRef>
+          <a:fontRef idx="minor">
+            <a:schemeClr val="tx1"/>
+          </a:fontRef>
+        </p:style>
+      </p:cxnSp>
+    </p:spTree>
+    <p:extLst>
+      <p:ext uri="{BB962C8B-B14F-4D97-AF65-F5344CB8AC3E}">
+        <p14:creationId xmlns:p14="http://schemas.microsoft.com/office/powerpoint/2010/main" val="1298460256"/>
+      </p:ext>
+    </p:extLst>
+  </p:cSld>
+  <p:clrMapOvr>
+    <a:masterClrMapping/>
+  </p:clrMapOvr>
+  <p:transition spd="med">
+    <p:fade/>
+  </p:transition>
+</p:sld>
+</file>
+
+<file path=ppt/slides/slide23.xml><?xml version="1.0" encoding="utf-8"?>
+<p:sld xmlns:a="http://schemas.openxmlformats.org/drawingml/2006/main" xmlns:r="http://schemas.openxmlformats.org/officeDocument/2006/relationships" xmlns:p="http://schemas.openxmlformats.org/presentationml/2006/main">
+  <p:cSld>
+    <p:spTree>
+      <p:nvGrpSpPr>
+        <p:cNvPr id="1" name=""/>
+        <p:cNvGrpSpPr/>
+        <p:nvPr/>
+      </p:nvGrpSpPr>
+      <p:grpSpPr>
+        <a:xfrm>
+          <a:off x="0" y="0"/>
+          <a:ext cx="0" cy="0"/>
+          <a:chOff x="0" y="0"/>
+          <a:chExt cx="0" cy="0"/>
+        </a:xfrm>
+      </p:grpSpPr>
+      <p:sp>
+        <p:nvSpPr>
+          <p:cNvPr id="2" name="Title 1"/>
+          <p:cNvSpPr>
+            <a:spLocks noGrp="1"/>
+          </p:cNvSpPr>
+          <p:nvPr>
+            <p:ph type="title"/>
+          </p:nvPr>
+        </p:nvSpPr>
+        <p:spPr/>
+        <p:txBody>
+          <a:bodyPr/>
+          <a:lstStyle/>
+          <a:p>
+            <a:r>
+              <a:rPr lang="en-US" dirty="0" smtClean="0"/>
+              <a:t>GE: Exporting Reports</a:t>
+            </a:r>
+            <a:endParaRPr lang="en-US" dirty="0"/>
+          </a:p>
+        </p:txBody>
+      </p:sp>
+      <p:sp>
+        <p:nvSpPr>
+          <p:cNvPr id="3" name="Text Placeholder 2"/>
+          <p:cNvSpPr>
+            <a:spLocks noGrp="1"/>
+          </p:cNvSpPr>
+          <p:nvPr>
+            <p:ph type="body" sz="quarter" idx="12"/>
+          </p:nvPr>
+        </p:nvSpPr>
+        <p:spPr>
+          <a:xfrm>
+            <a:off x="590405" y="1856198"/>
+            <a:ext cx="5035144" cy="5345953"/>
+          </a:xfrm>
+        </p:spPr>
+        <p:txBody>
+          <a:bodyPr/>
+          <a:lstStyle/>
+          <a:p>
+            <a:r>
+              <a:rPr lang="en-US" dirty="0" smtClean="0"/>
+              <a:t>Your saved report should look similar to this example with the text properly aligned and formatted.</a:t>
+            </a:r>
+          </a:p>
+          <a:p>
+            <a:endParaRPr lang="en-US" dirty="0"/>
+          </a:p>
+        </p:txBody>
+      </p:sp>
+      <p:pic>
+        <p:nvPicPr>
+          <p:cNvPr id="6" name="Picture 5"/>
+          <p:cNvPicPr>
+            <a:picLocks noChangeAspect="1"/>
+          </p:cNvPicPr>
+          <p:nvPr/>
+        </p:nvPicPr>
+        <p:blipFill>
+          <a:blip r:embed="rId2"/>
+          <a:stretch>
+            <a:fillRect/>
+          </a:stretch>
+        </p:blipFill>
+        <p:spPr>
+          <a:xfrm>
+            <a:off x="7474225" y="1060509"/>
+            <a:ext cx="8600523" cy="7035117"/>
+          </a:xfrm>
+          <a:prstGeom prst="rect">
+            <a:avLst/>
+          </a:prstGeom>
+          <a:ln>
+            <a:solidFill>
+              <a:schemeClr val="accent1"/>
+            </a:solidFill>
+          </a:ln>
+        </p:spPr>
+      </p:pic>
+    </p:spTree>
+    <p:extLst>
+      <p:ext uri="{BB962C8B-B14F-4D97-AF65-F5344CB8AC3E}">
+        <p14:creationId xmlns:p14="http://schemas.microsoft.com/office/powerpoint/2010/main" val="1212526399"/>
+      </p:ext>
+    </p:extLst>
+  </p:cSld>
+  <p:clrMapOvr>
+    <a:masterClrMapping/>
+  </p:clrMapOvr>
+  <p:transition spd="med">
+    <p:fade/>
+  </p:transition>
+</p:sld>
+</file>
+
+<file path=ppt/slides/slide24.xml><?xml version="1.0" encoding="utf-8"?>
+<p:sld xmlns:a="http://schemas.openxmlformats.org/drawingml/2006/main" xmlns:r="http://schemas.openxmlformats.org/officeDocument/2006/relationships" xmlns:p="http://schemas.openxmlformats.org/presentationml/2006/main">
+  <p:cSld>
+    <p:spTree>
+      <p:nvGrpSpPr>
+        <p:cNvPr id="1" name=""/>
+        <p:cNvGrpSpPr/>
+        <p:nvPr/>
+      </p:nvGrpSpPr>
+      <p:grpSpPr>
+        <a:xfrm>
+          <a:off x="0" y="0"/>
+          <a:ext cx="0" cy="0"/>
+          <a:chOff x="0" y="0"/>
+          <a:chExt cx="0" cy="0"/>
+        </a:xfrm>
+      </p:grpSpPr>
+      <p:sp>
+        <p:nvSpPr>
+          <p:cNvPr id="2" name="Title 1"/>
+          <p:cNvSpPr>
+            <a:spLocks noGrp="1"/>
+          </p:cNvSpPr>
+          <p:nvPr>
             <p:ph type="ctrTitle"/>
           </p:nvPr>
         </p:nvSpPr>
@@ -14792,7 +15197,13 @@
           <a:p>
             <a:r>
               <a:rPr lang="en-US" dirty="0" smtClean="0"/>
-              <a:t>READ NOTES</a:t>
+              <a:t>SD: My internal notes below to be deleted.</a:t>
+            </a:r>
+          </a:p>
+          <a:p>
+            <a:r>
+              <a:rPr lang="en-US" dirty="0" smtClean="0"/>
+              <a:t>TBD: Need to test PDF export on Mac.</a:t>
             </a:r>
             <a:endParaRPr lang="en-US" dirty="0"/>
           </a:p>
@@ -14821,172 +15232,7 @@
 </p:sld>
 </file>
 
-<file path=ppt/slides/slide22.xml><?xml version="1.0" encoding="utf-8"?>
-<p:sld xmlns:a="http://schemas.openxmlformats.org/drawingml/2006/main" xmlns:r="http://schemas.openxmlformats.org/officeDocument/2006/relationships" xmlns:p="http://schemas.openxmlformats.org/presentationml/2006/main">
-  <p:cSld>
-    <p:spTree>
-      <p:nvGrpSpPr>
-        <p:cNvPr id="1" name=""/>
-        <p:cNvGrpSpPr/>
-        <p:nvPr/>
-      </p:nvGrpSpPr>
-      <p:grpSpPr>
-        <a:xfrm>
-          <a:off x="0" y="0"/>
-          <a:ext cx="0" cy="0"/>
-          <a:chOff x="0" y="0"/>
-          <a:chExt cx="0" cy="0"/>
-        </a:xfrm>
-      </p:grpSpPr>
-      <p:sp>
-        <p:nvSpPr>
-          <p:cNvPr id="2" name="Title 1"/>
-          <p:cNvSpPr>
-            <a:spLocks noGrp="1"/>
-          </p:cNvSpPr>
-          <p:nvPr>
-            <p:ph type="ctrTitle"/>
-          </p:nvPr>
-        </p:nvSpPr>
-        <p:spPr/>
-        <p:txBody>
-          <a:bodyPr>
-            <a:normAutofit fontScale="90000"/>
-          </a:bodyPr>
-          <a:lstStyle/>
-          <a:p>
-            <a:r>
-              <a:rPr lang="en-US" dirty="0" smtClean="0"/>
-              <a:t>Scheduling Scans</a:t>
-            </a:r>
-            <a:endParaRPr lang="en-US" dirty="0"/>
-          </a:p>
-        </p:txBody>
-      </p:sp>
-      <p:sp>
-        <p:nvSpPr>
-          <p:cNvPr id="3" name="Subtitle 2"/>
-          <p:cNvSpPr>
-            <a:spLocks noGrp="1"/>
-          </p:cNvSpPr>
-          <p:nvPr>
-            <p:ph type="subTitle" idx="1"/>
-          </p:nvPr>
-        </p:nvSpPr>
-        <p:spPr>
-          <a:xfrm>
-            <a:off x="1671638" y="3271838"/>
-            <a:ext cx="12319000" cy="4317682"/>
-          </a:xfrm>
-        </p:spPr>
-        <p:txBody>
-          <a:bodyPr/>
-          <a:lstStyle/>
-          <a:p>
-            <a:endParaRPr lang="en-US" dirty="0"/>
-          </a:p>
-          <a:p>
-            <a:r>
-              <a:rPr lang="en-US" dirty="0"/>
-              <a:t>sudo tail -f /</a:t>
-            </a:r>
-            <a:r>
-              <a:rPr lang="en-US" dirty="0" smtClean="0"/>
-              <a:t>var/log/chef-compliance/core/current</a:t>
-            </a:r>
-          </a:p>
-          <a:p>
-            <a:endParaRPr lang="en-US" dirty="0"/>
-          </a:p>
-          <a:p>
-            <a:endParaRPr lang="en-US" dirty="0" smtClean="0"/>
-          </a:p>
-          <a:p>
-            <a:r>
-              <a:rPr lang="en-US" b="1" dirty="0" err="1">
-                <a:hlinkClick r:id="rId3"/>
-              </a:rPr>
-              <a:t>srenatus</a:t>
-            </a:r>
-            <a:r>
-              <a:rPr lang="en-US" b="1" dirty="0"/>
-              <a:t> </a:t>
-            </a:r>
-            <a:r>
-              <a:rPr lang="en-US" dirty="0"/>
-              <a:t>commented </a:t>
-            </a:r>
-            <a:r>
-              <a:rPr lang="en-US" dirty="0">
-                <a:hlinkClick r:id="rId4"/>
-              </a:rPr>
-              <a:t>9 minutes ago</a:t>
-            </a:r>
-            <a:endParaRPr lang="en-US" dirty="0"/>
-          </a:p>
-          <a:p>
-            <a:r>
-              <a:rPr lang="en-US" b="1" dirty="0">
-                <a:hlinkClick r:id="rId5"/>
-              </a:rPr>
-              <a:t>@</a:t>
-            </a:r>
-            <a:r>
-              <a:rPr lang="en-US" b="1" dirty="0" err="1">
-                <a:hlinkClick r:id="rId5"/>
-              </a:rPr>
-              <a:t>SteveDelFante</a:t>
-            </a:r>
-            <a:r>
-              <a:rPr lang="en-US" dirty="0"/>
-              <a:t> Hehe, I might hope so, but I wouldn't hold my breath. We have not found the real issue at play here yet. But tomorrows release is much more explicit about errors, and rejects "old jobs", so we can hopefully tackle this bug better with it. ;)</a:t>
-            </a:r>
-          </a:p>
-          <a:p>
-            <a:r>
-              <a:rPr lang="en-US" dirty="0"/>
-              <a:t>Scheduled times are still a rather split: recurring jobs uses UTC, one-off jobs local time. Nothing has changed there (yet -- </a:t>
-            </a:r>
-            <a:r>
-              <a:rPr lang="en-US" dirty="0">
-                <a:hlinkClick r:id="rId6" tooltip="Homogenize the handling of times, reject schedules in the past"/>
-              </a:rPr>
-              <a:t>#237</a:t>
-            </a:r>
-            <a:r>
-              <a:rPr lang="en-US" dirty="0"/>
-              <a:t>).</a:t>
-            </a:r>
-          </a:p>
-          <a:p>
-            <a:endParaRPr lang="en-US" dirty="0"/>
-          </a:p>
-        </p:txBody>
-      </p:sp>
-    </p:spTree>
-    <p:extLst>
-      <p:ext uri="{BB962C8B-B14F-4D97-AF65-F5344CB8AC3E}">
-        <p14:creationId xmlns:p14="http://schemas.microsoft.com/office/powerpoint/2010/main" val="2662865422"/>
-      </p:ext>
-    </p:extLst>
-  </p:cSld>
-  <p:clrMapOvr>
-    <a:masterClrMapping/>
-  </p:clrMapOvr>
-  <p:transition spd="med">
-    <p:fade/>
-  </p:transition>
-  <p:timing>
-    <p:tnLst>
-      <p:par>
-        <p:cTn id="1" dur="indefinite" restart="never" nodeType="tmRoot"/>
-      </p:par>
-    </p:tnLst>
-  </p:timing>
-</p:sld>
-</file>
-
-<file path=ppt/slides/slide23.xml><?xml version="1.0" encoding="utf-8"?>
+<file path=ppt/slides/slide25.xml><?xml version="1.0" encoding="utf-8"?>
 <p:sld xmlns:a="http://schemas.openxmlformats.org/drawingml/2006/main" xmlns:r="http://schemas.openxmlformats.org/officeDocument/2006/relationships" xmlns:p="http://schemas.openxmlformats.org/presentationml/2006/main">
   <p:cSld>
     <p:bg>
@@ -15166,7 +15412,7 @@
 </p:sld>
 </file>
 
-<file path=ppt/slides/slide24.xml><?xml version="1.0" encoding="utf-8"?>
+<file path=ppt/slides/slide26.xml><?xml version="1.0" encoding="utf-8"?>
 <p:sld xmlns:a="http://schemas.openxmlformats.org/drawingml/2006/main" xmlns:r="http://schemas.openxmlformats.org/officeDocument/2006/relationships" xmlns:p="http://schemas.openxmlformats.org/presentationml/2006/main">
   <p:cSld>
     <p:spTree>
@@ -15469,11 +15715,11 @@
             </a:r>
             <a:r>
               <a:rPr lang="en-US" dirty="0"/>
-              <a:t>on a daily basis without interruptions in reporting</a:t>
-            </a:r>
-            <a:r>
-              <a:rPr lang="en-US" dirty="0" smtClean="0"/>
-              <a:t>.</a:t>
+              <a:t>on a daily </a:t>
+            </a:r>
+            <a:r>
+              <a:rPr lang="en-US" dirty="0" smtClean="0"/>
+              <a:t>basis.</a:t>
             </a:r>
           </a:p>
           <a:p>
@@ -15599,7 +15845,15 @@
             </a:r>
             <a:r>
               <a:rPr lang="en-US" dirty="0" smtClean="0"/>
-              <a:t>UTC. (Universal Time Coordinated which equals GMT.)</a:t>
+              <a:t>UTC. </a:t>
+            </a:r>
+            <a:r>
+              <a:rPr lang="en-US" dirty="0"/>
+              <a:t>(Coordinated Universal Time, </a:t>
+            </a:r>
+            <a:r>
+              <a:rPr lang="en-US" dirty="0" smtClean="0"/>
+              <a:t>which equals GMT.)</a:t>
             </a:r>
             <a:endParaRPr lang="en-US" dirty="0"/>
           </a:p>
@@ -15825,13 +16079,8 @@
             </a:r>
             <a:r>
               <a:rPr lang="en-US" dirty="0" smtClean="0"/>
-              <a:t>elect </a:t>
-            </a:r>
-            <a:r>
-              <a:rPr lang="en-US" dirty="0" smtClean="0"/>
-              <a:t>one of your target nodes.</a:t>
-            </a:r>
-            <a:endParaRPr lang="en-US" dirty="0" smtClean="0"/>
+              <a:t>elect one of your target nodes.</a:t>
+            </a:r>
           </a:p>
           <a:p>
             <a:r>
@@ -15973,11 +16222,7 @@
             </a:r>
             <a:r>
               <a:rPr lang="en-US" dirty="0" smtClean="0"/>
-              <a:t> </a:t>
-            </a:r>
-            <a:r>
-              <a:rPr lang="en-US" dirty="0" smtClean="0"/>
-              <a:t>profile for a Linux node or </a:t>
+              <a:t> profile for a Linux node or the </a:t>
             </a:r>
             <a:r>
               <a:rPr lang="en-US" b="1" dirty="0" smtClean="0"/>
@@ -15987,7 +16232,6 @@
               <a:rPr lang="en-US" dirty="0" smtClean="0"/>
               <a:t> profile for a Windows node</a:t>
             </a:r>
-            <a:endParaRPr lang="en-US" dirty="0" smtClean="0"/>
           </a:p>
           <a:p>
             <a:r>
@@ -17831,27 +18075,6 @@
 </file>
 
 <file path=customXml/item2.xml><?xml version="1.0" encoding="utf-8"?>
-<p:properties xmlns:p="http://schemas.microsoft.com/office/2006/metadata/properties" xmlns:xsi="http://www.w3.org/2001/XMLSchema-instance" xmlns:pc="http://schemas.microsoft.com/office/infopath/2007/PartnerControls">
-  <documentManagement>
-    <_dlc_DocId xmlns="7bb5d761-a2ea-4873-95f7-7a6658fb3ef0">M4CWTKMW727E-592-73</_dlc_DocId>
-    <_dlc_DocIdUrl xmlns="7bb5d761-a2ea-4873-95f7-7a6658fb3ef0">
-      <Url>https://kms.vci.local/marketing/team/_layouts/DocIdRedir.aspx?ID=M4CWTKMW727E-592-73</Url>
-      <Description>M4CWTKMW727E-592-73</Description>
-    </_dlc_DocIdUrl>
-  </documentManagement>
-</p:properties>
-</file>
-
-<file path=customXml/item3.xml><?xml version="1.0" encoding="utf-8"?>
-<?mso-contentType ?>
-<FormTemplates xmlns="http://schemas.microsoft.com/sharepoint/v3/contenttype/forms">
-  <Display>DocumentLibraryForm</Display>
-  <Edit>DocumentLibraryForm</Edit>
-  <New>DocumentLibraryForm</New>
-</FormTemplates>
-</file>
-
-<file path=customXml/item4.xml><?xml version="1.0" encoding="utf-8"?>
 <?mso-contentType ?>
 <spe:Receivers xmlns:spe="http://schemas.microsoft.com/sharepoint/events">
   <Receiver>
@@ -17897,6 +18120,27 @@
 </spe:Receivers>
 </file>
 
+<file path=customXml/item3.xml><?xml version="1.0" encoding="utf-8"?>
+<?mso-contentType ?>
+<FormTemplates xmlns="http://schemas.microsoft.com/sharepoint/v3/contenttype/forms">
+  <Display>DocumentLibraryForm</Display>
+  <Edit>DocumentLibraryForm</Edit>
+  <New>DocumentLibraryForm</New>
+</FormTemplates>
+</file>
+
+<file path=customXml/item4.xml><?xml version="1.0" encoding="utf-8"?>
+<p:properties xmlns:p="http://schemas.microsoft.com/office/2006/metadata/properties" xmlns:xsi="http://www.w3.org/2001/XMLSchema-instance" xmlns:pc="http://schemas.microsoft.com/office/infopath/2007/PartnerControls">
+  <documentManagement>
+    <_dlc_DocId xmlns="7bb5d761-a2ea-4873-95f7-7a6658fb3ef0">M4CWTKMW727E-592-73</_dlc_DocId>
+    <_dlc_DocIdUrl xmlns="7bb5d761-a2ea-4873-95f7-7a6658fb3ef0">
+      <Url>https://kms.vci.local/marketing/team/_layouts/DocIdRedir.aspx?ID=M4CWTKMW727E-592-73</Url>
+      <Description>M4CWTKMW727E-592-73</Description>
+    </_dlc_DocIdUrl>
+  </documentManagement>
+</p:properties>
+</file>
+
 <file path=customXml/itemProps1.xml><?xml version="1.0" encoding="utf-8"?>
 <ds:datastoreItem xmlns:ds="http://schemas.openxmlformats.org/officeDocument/2006/customXml" ds:itemID="{164479E5-0B02-49AC-B79E-EC1D6164DDD3}">
   <ds:schemaRefs>
@@ -17916,6 +18160,22 @@
 </file>
 
 <file path=customXml/itemProps2.xml><?xml version="1.0" encoding="utf-8"?>
+<ds:datastoreItem xmlns:ds="http://schemas.openxmlformats.org/officeDocument/2006/customXml" ds:itemID="{B13EBC30-FE27-4C6A-B723-23FC2188F7DC}">
+  <ds:schemaRefs>
+    <ds:schemaRef ds:uri="http://schemas.microsoft.com/sharepoint/events"/>
+  </ds:schemaRefs>
+</ds:datastoreItem>
+</file>
+
+<file path=customXml/itemProps3.xml><?xml version="1.0" encoding="utf-8"?>
+<ds:datastoreItem xmlns:ds="http://schemas.openxmlformats.org/officeDocument/2006/customXml" ds:itemID="{5CDEB364-43EC-4510-9881-539C2A3FCE9E}">
+  <ds:schemaRefs>
+    <ds:schemaRef ds:uri="http://schemas.microsoft.com/sharepoint/v3/contenttype/forms"/>
+  </ds:schemaRefs>
+</ds:datastoreItem>
+</file>
+
+<file path=customXml/itemProps4.xml><?xml version="1.0" encoding="utf-8"?>
 <ds:datastoreItem xmlns:ds="http://schemas.openxmlformats.org/officeDocument/2006/customXml" ds:itemID="{6921749B-AEB7-461B-845F-603CABD25259}">
   <ds:schemaRefs>
     <ds:schemaRef ds:uri="http://schemas.microsoft.com/office/2006/documentManagement/types"/>
@@ -17929,20 +18189,4 @@
     <ds:schemaRef ds:uri="http://purl.org/dc/dcmitype/"/>
   </ds:schemaRefs>
 </ds:datastoreItem>
-</file>
-
-<file path=customXml/itemProps3.xml><?xml version="1.0" encoding="utf-8"?>
-<ds:datastoreItem xmlns:ds="http://schemas.openxmlformats.org/officeDocument/2006/customXml" ds:itemID="{5CDEB364-43EC-4510-9881-539C2A3FCE9E}">
-  <ds:schemaRefs>
-    <ds:schemaRef ds:uri="http://schemas.microsoft.com/sharepoint/v3/contenttype/forms"/>
-  </ds:schemaRefs>
-</ds:datastoreItem>
-</file>
-
-<file path=customXml/itemProps4.xml><?xml version="1.0" encoding="utf-8"?>
-<ds:datastoreItem xmlns:ds="http://schemas.openxmlformats.org/officeDocument/2006/customXml" ds:itemID="{B13EBC30-FE27-4C6A-B723-23FC2188F7DC}">
-  <ds:schemaRefs>
-    <ds:schemaRef ds:uri="http://schemas.microsoft.com/sharepoint/events"/>
-  </ds:schemaRefs>
-</ds:datastoreItem>
 </file>
</xml_diff>